<commit_message>
update bib, add images
</commit_message>
<xml_diff>
--- a/techreports/2013/13-09/figures/sgseam-userguide-steps.pptx
+++ b/techreports/2013/13-09/figures/sgseam-userguide-steps.pptx
@@ -104,6 +104,22 @@
       </a:defRPr>
     </a:lvl9pPr>
   </p:defaultTextStyle>
+  <p:extLst>
+    <p:ext uri="{EFAFB233-063F-42B5-8137-9DF3F51BA10A}">
+      <p15:sldGuideLst xmlns:p15="http://schemas.microsoft.com/office/powerpoint/2012/main">
+        <p15:guide id="1" orient="horz" pos="2160">
+          <p15:clr>
+            <a:srgbClr val="A4A3A4"/>
+          </p15:clr>
+        </p15:guide>
+        <p15:guide id="2" pos="2880">
+          <p15:clr>
+            <a:srgbClr val="A4A3A4"/>
+          </p15:clr>
+        </p15:guide>
+      </p15:sldGuideLst>
+    </p:ext>
+  </p:extLst>
 </p:presentation>
 </file>
 
@@ -1805,23 +1821,23 @@
     </dgm:pt>
   </dgm:ptLst>
   <dgm:cxnLst>
+    <dgm:cxn modelId="{AF4F0A1D-6187-F544-862B-6440ED457216}" srcId="{EE6ED75A-4597-7547-A81D-876EB91A9385}" destId="{93C87082-C978-9148-AC5F-1CD37A05623E}" srcOrd="0" destOrd="0" parTransId="{C3CCF1D3-656A-0C43-9677-F6F6B41DF11D}" sibTransId="{F0D1D0C7-A2BB-0147-BFC6-994C6928EE58}"/>
     <dgm:cxn modelId="{809BF21C-7F9A-7D4C-B16D-B78C9F3D17FE}" type="presOf" srcId="{F0D1D0C7-A2BB-0147-BFC6-994C6928EE58}" destId="{2FAAA329-69D9-EA4D-B7C5-F273B80E5760}" srcOrd="0" destOrd="0" presId="urn:microsoft.com/office/officeart/2005/8/layout/process1"/>
-    <dgm:cxn modelId="{AF4F0A1D-6187-F544-862B-6440ED457216}" srcId="{EE6ED75A-4597-7547-A81D-876EB91A9385}" destId="{93C87082-C978-9148-AC5F-1CD37A05623E}" srcOrd="0" destOrd="0" parTransId="{C3CCF1D3-656A-0C43-9677-F6F6B41DF11D}" sibTransId="{F0D1D0C7-A2BB-0147-BFC6-994C6928EE58}"/>
     <dgm:cxn modelId="{CB0A728A-0468-3E41-9B71-37E8D6CC1E65}" srcId="{883288A5-2754-9145-A9D5-F9D0BA03BE85}" destId="{439C04A7-14DC-B744-9D67-5AC95D70F6E4}" srcOrd="1" destOrd="0" parTransId="{290C1CC5-FF66-3146-B1FF-C0DC6B071630}" sibTransId="{93271C81-211F-8B4E-AA64-A36C14FDF587}"/>
+    <dgm:cxn modelId="{9E251FED-29DF-EC46-86FE-362D8AE54B7F}" type="presOf" srcId="{91F8FE84-1337-4047-A5E3-08B4DFB281D4}" destId="{A72ED4E5-185A-334D-AF75-4E2C72EDF1D7}" srcOrd="0" destOrd="1" presId="urn:microsoft.com/office/officeart/2005/8/layout/process1"/>
     <dgm:cxn modelId="{8D44AFB3-6352-4E4C-BC63-41A41AA0382D}" type="presOf" srcId="{D7320DBF-F352-1F4C-B7B4-F3D3370FC5C2}" destId="{6D7DF168-A745-F44E-82D0-CD09CC1BCFF2}" srcOrd="0" destOrd="0" presId="urn:microsoft.com/office/officeart/2005/8/layout/process1"/>
-    <dgm:cxn modelId="{9E251FED-29DF-EC46-86FE-362D8AE54B7F}" type="presOf" srcId="{91F8FE84-1337-4047-A5E3-08B4DFB281D4}" destId="{A72ED4E5-185A-334D-AF75-4E2C72EDF1D7}" srcOrd="0" destOrd="1" presId="urn:microsoft.com/office/officeart/2005/8/layout/process1"/>
     <dgm:cxn modelId="{7438EBE9-3D3C-AA42-86EC-46C72A9CA1CF}" srcId="{0DD03C4E-039B-F64F-A5ED-9F3F6C37F389}" destId="{0FB0D1E4-A711-D042-AF27-6C6C1723D09A}" srcOrd="1" destOrd="0" parTransId="{8479D09D-6E78-AD48-B116-A603AD3AE04A}" sibTransId="{3E1D1872-EA92-C149-A627-9372147C8564}"/>
     <dgm:cxn modelId="{D5FD634F-A349-7A4C-AB04-890B3451E2C8}" srcId="{883288A5-2754-9145-A9D5-F9D0BA03BE85}" destId="{754F7C9A-7746-C740-AC2D-F15CA60FD8EB}" srcOrd="2" destOrd="0" parTransId="{E2F1FFE9-4AF4-BA46-9644-14A515C04231}" sibTransId="{6AD537BD-2E31-7847-8542-06C6B93DE77D}"/>
     <dgm:cxn modelId="{2ADE675E-31F3-3B4F-8B8D-4DACF46EE6D4}" type="presOf" srcId="{0FB0D1E4-A711-D042-AF27-6C6C1723D09A}" destId="{A72ED4E5-185A-334D-AF75-4E2C72EDF1D7}" srcOrd="0" destOrd="2" presId="urn:microsoft.com/office/officeart/2005/8/layout/process1"/>
-    <dgm:cxn modelId="{9C3F986B-4185-E745-ACF3-066D49E15D05}" srcId="{93C87082-C978-9148-AC5F-1CD37A05623E}" destId="{CED37743-4581-BE41-9E7F-365CD0AC71AB}" srcOrd="0" destOrd="0" parTransId="{8032F10C-D597-A94A-A18F-93F1DC121FB7}" sibTransId="{270C84AB-EA64-CD43-8BA0-2115A2CF5FC8}"/>
     <dgm:cxn modelId="{411140A1-4243-D444-8BB4-B7018617FF4E}" type="presOf" srcId="{CED37743-4581-BE41-9E7F-365CD0AC71AB}" destId="{7C8FAA48-E2B7-094C-88D9-5E5B177809D5}" srcOrd="0" destOrd="1" presId="urn:microsoft.com/office/officeart/2005/8/layout/process1"/>
     <dgm:cxn modelId="{1FCA0FFF-BF68-944A-89F0-2AC02A40C70D}" srcId="{0DD03C4E-039B-F64F-A5ED-9F3F6C37F389}" destId="{FE73098B-EADD-FE4C-B2CC-65F225D7E366}" srcOrd="2" destOrd="0" parTransId="{6A825C6D-0D4C-F444-AEA0-8411C990F9EC}" sibTransId="{A8BFF42F-253D-214B-9A0B-3A44C8EFA4B4}"/>
+    <dgm:cxn modelId="{9C3F986B-4185-E745-ACF3-066D49E15D05}" srcId="{93C87082-C978-9148-AC5F-1CD37A05623E}" destId="{CED37743-4581-BE41-9E7F-365CD0AC71AB}" srcOrd="0" destOrd="0" parTransId="{8032F10C-D597-A94A-A18F-93F1DC121FB7}" sibTransId="{270C84AB-EA64-CD43-8BA0-2115A2CF5FC8}"/>
     <dgm:cxn modelId="{E0702D1C-5023-9E4D-8D24-5E20BF955E7D}" type="presOf" srcId="{439C04A7-14DC-B744-9D67-5AC95D70F6E4}" destId="{A40A3E86-DC86-6040-993A-2C3164EBD86A}" srcOrd="0" destOrd="2" presId="urn:microsoft.com/office/officeart/2005/8/layout/process1"/>
     <dgm:cxn modelId="{C7D9EB03-2D48-0241-A574-C4A8547C107F}" type="presOf" srcId="{93C87082-C978-9148-AC5F-1CD37A05623E}" destId="{7C8FAA48-E2B7-094C-88D9-5E5B177809D5}" srcOrd="0" destOrd="0" presId="urn:microsoft.com/office/officeart/2005/8/layout/process1"/>
     <dgm:cxn modelId="{A5B2A051-1517-2446-AD20-D4988116B4A4}" srcId="{EE6ED75A-4597-7547-A81D-876EB91A9385}" destId="{0DD03C4E-039B-F64F-A5ED-9F3F6C37F389}" srcOrd="1" destOrd="0" parTransId="{7DC0B663-30F5-864E-950D-136D5196E720}" sibTransId="{D7320DBF-F352-1F4C-B7B4-F3D3370FC5C2}"/>
     <dgm:cxn modelId="{2134B228-A7CE-F344-8906-3BAE070EFF30}" srcId="{93C87082-C978-9148-AC5F-1CD37A05623E}" destId="{F70C00D6-A907-054F-8C16-E1E2082C694C}" srcOrd="2" destOrd="0" parTransId="{6672C9BA-4ABF-3843-BA1F-B864DC9A6D93}" sibTransId="{9E23234D-FB00-8A47-844D-D084A286CAA0}"/>
+    <dgm:cxn modelId="{0A2D6371-DC7A-2A46-9A67-A1506F04C712}" type="presOf" srcId="{EE6ED75A-4597-7547-A81D-876EB91A9385}" destId="{5A7C381E-9458-9640-A04F-4B39A5489543}" srcOrd="0" destOrd="0" presId="urn:microsoft.com/office/officeart/2005/8/layout/process1"/>
     <dgm:cxn modelId="{ED2EEA2D-9209-2C41-8E57-8E02EC6D69DA}" type="presOf" srcId="{F0D1D0C7-A2BB-0147-BFC6-994C6928EE58}" destId="{86A4BBAF-DAB3-8B4E-8F36-B724F02091A9}" srcOrd="1" destOrd="0" presId="urn:microsoft.com/office/officeart/2005/8/layout/process1"/>
-    <dgm:cxn modelId="{0A2D6371-DC7A-2A46-9A67-A1506F04C712}" type="presOf" srcId="{EE6ED75A-4597-7547-A81D-876EB91A9385}" destId="{5A7C381E-9458-9640-A04F-4B39A5489543}" srcOrd="0" destOrd="0" presId="urn:microsoft.com/office/officeart/2005/8/layout/process1"/>
     <dgm:cxn modelId="{4026129B-65D8-0E49-B09C-7A7D3F0AB60E}" srcId="{93C87082-C978-9148-AC5F-1CD37A05623E}" destId="{FE6E6F60-E623-C940-A32A-2CABC9C93320}" srcOrd="1" destOrd="0" parTransId="{1B8CAEB7-7EBD-484A-B544-1BC16B248341}" sibTransId="{0A236FCC-6A2E-DD44-89FD-A8E278526B84}"/>
     <dgm:cxn modelId="{9C6595AD-5365-3A45-B669-0C7247248E86}" type="presOf" srcId="{FE73098B-EADD-FE4C-B2CC-65F225D7E366}" destId="{A72ED4E5-185A-334D-AF75-4E2C72EDF1D7}" srcOrd="0" destOrd="3" presId="urn:microsoft.com/office/officeart/2005/8/layout/process1"/>
     <dgm:cxn modelId="{F0380C19-BA77-884B-8791-254729099D62}" type="presOf" srcId="{D7320DBF-F352-1F4C-B7B4-F3D3370FC5C2}" destId="{8180A515-E02D-5C43-AA6D-DB8702B27852}" srcOrd="1" destOrd="0" presId="urn:microsoft.com/office/officeart/2005/8/layout/process1"/>
@@ -1875,8 +1891,8 @@
       </dsp:nvSpPr>
       <dsp:spPr>
         <a:xfrm>
-          <a:off x="1685" y="2200803"/>
-          <a:ext cx="2466197" cy="2246842"/>
+          <a:off x="1685" y="2189179"/>
+          <a:ext cx="2466197" cy="2270091"/>
         </a:xfrm>
         <a:prstGeom prst="roundRect">
           <a:avLst>
@@ -2041,8 +2057,8 @@
         </a:p>
       </dsp:txBody>
       <dsp:txXfrm>
-        <a:off x="67493" y="2266611"/>
-        <a:ext cx="2334581" cy="2115226"/>
+        <a:off x="68174" y="2255668"/>
+        <a:ext cx="2333219" cy="2137113"/>
       </dsp:txXfrm>
     </dsp:sp>
     <dsp:sp modelId="{2FAAA329-69D9-EA4D-B7C5-F273B80E5760}">
@@ -2147,8 +2163,8 @@
       </dsp:nvSpPr>
       <dsp:spPr>
         <a:xfrm>
-          <a:off x="3365129" y="2200803"/>
-          <a:ext cx="2243118" cy="2246842"/>
+          <a:off x="3365129" y="2189179"/>
+          <a:ext cx="2243118" cy="2270091"/>
         </a:xfrm>
         <a:prstGeom prst="roundRect">
           <a:avLst>
@@ -2313,8 +2329,8 @@
         </a:p>
       </dsp:txBody>
       <dsp:txXfrm>
-        <a:off x="3430828" y="2266502"/>
-        <a:ext cx="2111720" cy="2115444"/>
+        <a:off x="3430828" y="2254878"/>
+        <a:ext cx="2111720" cy="2138693"/>
       </dsp:txXfrm>
     </dsp:sp>
     <dsp:sp modelId="{6D7DF168-A745-F44E-82D0-CD09CC1BCFF2}">
@@ -2419,8 +2435,8 @@
       </dsp:nvSpPr>
       <dsp:spPr>
         <a:xfrm>
-          <a:off x="6505496" y="2200803"/>
-          <a:ext cx="2243118" cy="2246842"/>
+          <a:off x="6505496" y="2189179"/>
+          <a:ext cx="2243118" cy="2270091"/>
         </a:xfrm>
         <a:prstGeom prst="roundRect">
           <a:avLst>
@@ -2585,8 +2601,8 @@
         </a:p>
       </dsp:txBody>
       <dsp:txXfrm>
-        <a:off x="6571195" y="2266502"/>
-        <a:ext cx="2111720" cy="2115444"/>
+        <a:off x="6571195" y="2254878"/>
+        <a:ext cx="2111720" cy="2138693"/>
       </dsp:txXfrm>
     </dsp:sp>
   </dsp:spTree>
@@ -3980,7 +3996,7 @@
           <a:p>
             <a:fld id="{C340F871-CF62-B942-93BA-281D56756235}" type="datetimeFigureOut">
               <a:rPr lang="en-US" smtClean="0"/>
-              <a:t>10/25/13</a:t>
+              <a:t>4/1/15</a:t>
             </a:fld>
             <a:endParaRPr lang="en-US"/>
           </a:p>
@@ -4150,7 +4166,7 @@
           <a:p>
             <a:fld id="{C340F871-CF62-B942-93BA-281D56756235}" type="datetimeFigureOut">
               <a:rPr lang="en-US" smtClean="0"/>
-              <a:t>10/25/13</a:t>
+              <a:t>4/1/15</a:t>
             </a:fld>
             <a:endParaRPr lang="en-US"/>
           </a:p>
@@ -4330,7 +4346,7 @@
           <a:p>
             <a:fld id="{C340F871-CF62-B942-93BA-281D56756235}" type="datetimeFigureOut">
               <a:rPr lang="en-US" smtClean="0"/>
-              <a:t>10/25/13</a:t>
+              <a:t>4/1/15</a:t>
             </a:fld>
             <a:endParaRPr lang="en-US"/>
           </a:p>
@@ -4500,7 +4516,7 @@
           <a:p>
             <a:fld id="{C340F871-CF62-B942-93BA-281D56756235}" type="datetimeFigureOut">
               <a:rPr lang="en-US" smtClean="0"/>
-              <a:t>10/25/13</a:t>
+              <a:t>4/1/15</a:t>
             </a:fld>
             <a:endParaRPr lang="en-US"/>
           </a:p>
@@ -4746,7 +4762,7 @@
           <a:p>
             <a:fld id="{C340F871-CF62-B942-93BA-281D56756235}" type="datetimeFigureOut">
               <a:rPr lang="en-US" smtClean="0"/>
-              <a:t>10/25/13</a:t>
+              <a:t>4/1/15</a:t>
             </a:fld>
             <a:endParaRPr lang="en-US"/>
           </a:p>
@@ -5034,7 +5050,7 @@
           <a:p>
             <a:fld id="{C340F871-CF62-B942-93BA-281D56756235}" type="datetimeFigureOut">
               <a:rPr lang="en-US" smtClean="0"/>
-              <a:t>10/25/13</a:t>
+              <a:t>4/1/15</a:t>
             </a:fld>
             <a:endParaRPr lang="en-US"/>
           </a:p>
@@ -5456,7 +5472,7 @@
           <a:p>
             <a:fld id="{C340F871-CF62-B942-93BA-281D56756235}" type="datetimeFigureOut">
               <a:rPr lang="en-US" smtClean="0"/>
-              <a:t>10/25/13</a:t>
+              <a:t>4/1/15</a:t>
             </a:fld>
             <a:endParaRPr lang="en-US"/>
           </a:p>
@@ -5574,7 +5590,7 @@
           <a:p>
             <a:fld id="{C340F871-CF62-B942-93BA-281D56756235}" type="datetimeFigureOut">
               <a:rPr lang="en-US" smtClean="0"/>
-              <a:t>10/25/13</a:t>
+              <a:t>4/1/15</a:t>
             </a:fld>
             <a:endParaRPr lang="en-US"/>
           </a:p>
@@ -5669,7 +5685,7 @@
           <a:p>
             <a:fld id="{C340F871-CF62-B942-93BA-281D56756235}" type="datetimeFigureOut">
               <a:rPr lang="en-US" smtClean="0"/>
-              <a:t>10/25/13</a:t>
+              <a:t>4/1/15</a:t>
             </a:fld>
             <a:endParaRPr lang="en-US"/>
           </a:p>
@@ -5946,7 +5962,7 @@
           <a:p>
             <a:fld id="{C340F871-CF62-B942-93BA-281D56756235}" type="datetimeFigureOut">
               <a:rPr lang="en-US" smtClean="0"/>
-              <a:t>10/25/13</a:t>
+              <a:t>4/1/15</a:t>
             </a:fld>
             <a:endParaRPr lang="en-US"/>
           </a:p>
@@ -6199,7 +6215,7 @@
           <a:p>
             <a:fld id="{C340F871-CF62-B942-93BA-281D56756235}" type="datetimeFigureOut">
               <a:rPr lang="en-US" smtClean="0"/>
-              <a:t>10/25/13</a:t>
+              <a:t>4/1/15</a:t>
             </a:fld>
             <a:endParaRPr lang="en-US"/>
           </a:p>
@@ -6412,7 +6428,7 @@
           <a:p>
             <a:fld id="{C340F871-CF62-B942-93BA-281D56756235}" type="datetimeFigureOut">
               <a:rPr lang="en-US" smtClean="0"/>
-              <a:t>10/25/13</a:t>
+              <a:t>4/1/15</a:t>
             </a:fld>
             <a:endParaRPr lang="en-US"/>
           </a:p>
@@ -6794,7 +6810,7 @@
           <p:nvPr>
             <p:extLst>
               <p:ext uri="{D42A27DB-BD31-4B8C-83A1-F6EECF244321}">
-                <p14:modId xmlns:p14="http://schemas.microsoft.com/office/powerpoint/2010/main" val="1221731162"/>
+                <p14:modId xmlns:p14="http://schemas.microsoft.com/office/powerpoint/2010/main" val="846930886"/>
               </p:ext>
             </p:extLst>
           </p:nvPr>
@@ -6809,6 +6825,255 @@
           </a:graphicData>
         </a:graphic>
       </p:graphicFrame>
+      <p:sp>
+        <p:nvSpPr>
+          <p:cNvPr id="2" name="TextBox 1"/>
+          <p:cNvSpPr txBox="1"/>
+          <p:nvPr/>
+        </p:nvSpPr>
+        <p:spPr>
+          <a:xfrm>
+            <a:off x="555172" y="4942114"/>
+            <a:ext cx="1719943" cy="646331"/>
+          </a:xfrm>
+          <a:prstGeom prst="rect">
+            <a:avLst/>
+          </a:prstGeom>
+        </p:spPr>
+        <p:style>
+          <a:lnRef idx="0">
+            <a:schemeClr val="dk1"/>
+          </a:lnRef>
+          <a:fillRef idx="3">
+            <a:schemeClr val="dk1"/>
+          </a:fillRef>
+          <a:effectRef idx="3">
+            <a:schemeClr val="dk1"/>
+          </a:effectRef>
+          <a:fontRef idx="minor">
+            <a:schemeClr val="lt1"/>
+          </a:fontRef>
+        </p:style>
+        <p:txBody>
+          <a:bodyPr wrap="square" rtlCol="0">
+            <a:spAutoFit/>
+          </a:bodyPr>
+          <a:lstStyle/>
+          <a:p>
+            <a:r>
+              <a:rPr lang="en-US" dirty="0" smtClean="0"/>
+              <a:t>Assessment Plan document</a:t>
+            </a:r>
+            <a:endParaRPr lang="en-US" dirty="0"/>
+          </a:p>
+        </p:txBody>
+      </p:sp>
+      <p:sp>
+        <p:nvSpPr>
+          <p:cNvPr id="5" name="TextBox 4"/>
+          <p:cNvSpPr txBox="1"/>
+          <p:nvPr/>
+        </p:nvSpPr>
+        <p:spPr>
+          <a:xfrm>
+            <a:off x="3894364" y="4942113"/>
+            <a:ext cx="1719943" cy="646331"/>
+          </a:xfrm>
+          <a:prstGeom prst="rect">
+            <a:avLst/>
+          </a:prstGeom>
+        </p:spPr>
+        <p:style>
+          <a:lnRef idx="0">
+            <a:schemeClr val="dk1"/>
+          </a:lnRef>
+          <a:fillRef idx="3">
+            <a:schemeClr val="dk1"/>
+          </a:fillRef>
+          <a:effectRef idx="3">
+            <a:schemeClr val="dk1"/>
+          </a:effectRef>
+          <a:fontRef idx="minor">
+            <a:schemeClr val="lt1"/>
+          </a:fontRef>
+        </p:style>
+        <p:txBody>
+          <a:bodyPr wrap="square" rtlCol="0">
+            <a:spAutoFit/>
+          </a:bodyPr>
+          <a:lstStyle/>
+          <a:p>
+            <a:r>
+              <a:rPr lang="en-US" dirty="0" smtClean="0"/>
+              <a:t>Data </a:t>
+            </a:r>
+          </a:p>
+          <a:p>
+            <a:r>
+              <a:rPr lang="en-US" dirty="0" smtClean="0"/>
+              <a:t>repository</a:t>
+            </a:r>
+            <a:endParaRPr lang="en-US" dirty="0"/>
+          </a:p>
+        </p:txBody>
+      </p:sp>
+      <p:sp>
+        <p:nvSpPr>
+          <p:cNvPr id="6" name="TextBox 5"/>
+          <p:cNvSpPr txBox="1"/>
+          <p:nvPr/>
+        </p:nvSpPr>
+        <p:spPr>
+          <a:xfrm>
+            <a:off x="6901543" y="4942112"/>
+            <a:ext cx="1915886" cy="646331"/>
+          </a:xfrm>
+          <a:prstGeom prst="rect">
+            <a:avLst/>
+          </a:prstGeom>
+        </p:spPr>
+        <p:style>
+          <a:lnRef idx="0">
+            <a:schemeClr val="dk1"/>
+          </a:lnRef>
+          <a:fillRef idx="3">
+            <a:schemeClr val="dk1"/>
+          </a:fillRef>
+          <a:effectRef idx="3">
+            <a:schemeClr val="dk1"/>
+          </a:effectRef>
+          <a:fontRef idx="minor">
+            <a:schemeClr val="lt1"/>
+          </a:fontRef>
+        </p:style>
+        <p:txBody>
+          <a:bodyPr wrap="square" rtlCol="0">
+            <a:spAutoFit/>
+          </a:bodyPr>
+          <a:lstStyle/>
+          <a:p>
+            <a:r>
+              <a:rPr lang="en-US" dirty="0" smtClean="0"/>
+              <a:t>Improvement Action document</a:t>
+            </a:r>
+            <a:endParaRPr lang="en-US" dirty="0"/>
+          </a:p>
+        </p:txBody>
+      </p:sp>
+      <p:sp>
+        <p:nvSpPr>
+          <p:cNvPr id="3" name="Down Arrow 2"/>
+          <p:cNvSpPr/>
+          <p:nvPr/>
+        </p:nvSpPr>
+        <p:spPr>
+          <a:xfrm>
+            <a:off x="1262743" y="4561114"/>
+            <a:ext cx="228600" cy="380999"/>
+          </a:xfrm>
+          <a:prstGeom prst="downArrow">
+            <a:avLst/>
+          </a:prstGeom>
+        </p:spPr>
+        <p:style>
+          <a:lnRef idx="1">
+            <a:schemeClr val="accent1"/>
+          </a:lnRef>
+          <a:fillRef idx="3">
+            <a:schemeClr val="accent1"/>
+          </a:fillRef>
+          <a:effectRef idx="2">
+            <a:schemeClr val="accent1"/>
+          </a:effectRef>
+          <a:fontRef idx="minor">
+            <a:schemeClr val="lt1"/>
+          </a:fontRef>
+        </p:style>
+        <p:txBody>
+          <a:bodyPr rtlCol="0" anchor="ctr"/>
+          <a:lstStyle/>
+          <a:p>
+            <a:pPr algn="ctr"/>
+            <a:endParaRPr lang="en-US"/>
+          </a:p>
+        </p:txBody>
+      </p:sp>
+      <p:sp>
+        <p:nvSpPr>
+          <p:cNvPr id="7" name="Down Arrow 6"/>
+          <p:cNvSpPr/>
+          <p:nvPr/>
+        </p:nvSpPr>
+        <p:spPr>
+          <a:xfrm>
+            <a:off x="4678136" y="4561114"/>
+            <a:ext cx="228600" cy="380999"/>
+          </a:xfrm>
+          <a:prstGeom prst="downArrow">
+            <a:avLst/>
+          </a:prstGeom>
+        </p:spPr>
+        <p:style>
+          <a:lnRef idx="1">
+            <a:schemeClr val="accent1"/>
+          </a:lnRef>
+          <a:fillRef idx="3">
+            <a:schemeClr val="accent1"/>
+          </a:fillRef>
+          <a:effectRef idx="2">
+            <a:schemeClr val="accent1"/>
+          </a:effectRef>
+          <a:fontRef idx="minor">
+            <a:schemeClr val="lt1"/>
+          </a:fontRef>
+        </p:style>
+        <p:txBody>
+          <a:bodyPr rtlCol="0" anchor="ctr"/>
+          <a:lstStyle/>
+          <a:p>
+            <a:pPr algn="ctr"/>
+            <a:endParaRPr lang="en-US"/>
+          </a:p>
+        </p:txBody>
+      </p:sp>
+      <p:sp>
+        <p:nvSpPr>
+          <p:cNvPr id="8" name="Down Arrow 7"/>
+          <p:cNvSpPr/>
+          <p:nvPr/>
+        </p:nvSpPr>
+        <p:spPr>
+          <a:xfrm>
+            <a:off x="7766957" y="4561113"/>
+            <a:ext cx="228600" cy="380999"/>
+          </a:xfrm>
+          <a:prstGeom prst="downArrow">
+            <a:avLst/>
+          </a:prstGeom>
+        </p:spPr>
+        <p:style>
+          <a:lnRef idx="1">
+            <a:schemeClr val="accent1"/>
+          </a:lnRef>
+          <a:fillRef idx="3">
+            <a:schemeClr val="accent1"/>
+          </a:fillRef>
+          <a:effectRef idx="2">
+            <a:schemeClr val="accent1"/>
+          </a:effectRef>
+          <a:fontRef idx="minor">
+            <a:schemeClr val="lt1"/>
+          </a:fontRef>
+        </p:style>
+        <p:txBody>
+          <a:bodyPr rtlCol="0" anchor="ctr"/>
+          <a:lstStyle/>
+          <a:p>
+            <a:pPr algn="ctr"/>
+            <a:endParaRPr lang="en-US"/>
+          </a:p>
+        </p:txBody>
+      </p:sp>
     </p:spTree>
     <p:extLst>
       <p:ext uri="{BB962C8B-B14F-4D97-AF65-F5344CB8AC3E}">
@@ -6822,7 +7087,7 @@
   <p:timing>
     <p:tnLst>
       <p:par>
-        <p:cTn xmlns:p14="http://schemas.microsoft.com/office/powerpoint/2010/main" id="1" dur="indefinite" restart="never" nodeType="tmRoot"/>
+        <p:cTn id="1" dur="indefinite" restart="never" nodeType="tmRoot"/>
       </p:par>
     </p:tnLst>
   </p:timing>

</xml_diff>